<commit_message>
Improved description of ApplicationLayering.rst. (Applied review comments) #6
</commit_message>
<xml_diff>
--- a/source/Overview/images_ApplicationLayering/materialApplicationLayering.pptx
+++ b/source/Overview/images_ApplicationLayering/materialApplicationLayering.pptx
@@ -211,7 +211,7 @@
           <a:p>
             <a:fld id="{3BB47352-BF5A-4CD2-B029-996118CD8E01}" type="datetimeFigureOut">
               <a:rPr kumimoji="1" lang="ja-JP" altLang="en-US" smtClean="0"/>
-              <a:t>2014/10/15</a:t>
+              <a:t>2014/12/23</a:t>
             </a:fld>
             <a:endParaRPr kumimoji="1" lang="ja-JP" altLang="en-US"/>
           </a:p>
@@ -1112,7 +1112,7 @@
           <a:p>
             <a:fld id="{7B9B12EC-6AA0-374B-A2D3-850081A07A26}" type="datetimeFigureOut">
               <a:rPr kumimoji="1" lang="ja-JP" altLang="en-US" smtClean="0"/>
-              <a:t>2014/10/15</a:t>
+              <a:t>2014/12/23</a:t>
             </a:fld>
             <a:endParaRPr kumimoji="1" lang="ja-JP" altLang="en-US"/>
           </a:p>
@@ -1314,7 +1314,7 @@
           <a:p>
             <a:fld id="{7B9B12EC-6AA0-374B-A2D3-850081A07A26}" type="datetimeFigureOut">
               <a:rPr kumimoji="1" lang="ja-JP" altLang="en-US" smtClean="0"/>
-              <a:t>2014/10/15</a:t>
+              <a:t>2014/12/23</a:t>
             </a:fld>
             <a:endParaRPr kumimoji="1" lang="ja-JP" altLang="en-US"/>
           </a:p>
@@ -1526,7 +1526,7 @@
           <a:p>
             <a:fld id="{7B9B12EC-6AA0-374B-A2D3-850081A07A26}" type="datetimeFigureOut">
               <a:rPr kumimoji="1" lang="ja-JP" altLang="en-US" smtClean="0"/>
-              <a:t>2014/10/15</a:t>
+              <a:t>2014/12/23</a:t>
             </a:fld>
             <a:endParaRPr kumimoji="1" lang="ja-JP" altLang="en-US"/>
           </a:p>
@@ -1728,7 +1728,7 @@
           <a:p>
             <a:fld id="{7B9B12EC-6AA0-374B-A2D3-850081A07A26}" type="datetimeFigureOut">
               <a:rPr kumimoji="1" lang="ja-JP" altLang="en-US" smtClean="0"/>
-              <a:t>2014/10/15</a:t>
+              <a:t>2014/12/23</a:t>
             </a:fld>
             <a:endParaRPr kumimoji="1" lang="ja-JP" altLang="en-US"/>
           </a:p>
@@ -1974,7 +1974,7 @@
           <a:p>
             <a:fld id="{7B9B12EC-6AA0-374B-A2D3-850081A07A26}" type="datetimeFigureOut">
               <a:rPr kumimoji="1" lang="ja-JP" altLang="en-US" smtClean="0"/>
-              <a:t>2014/10/15</a:t>
+              <a:t>2014/12/23</a:t>
             </a:fld>
             <a:endParaRPr kumimoji="1" lang="ja-JP" altLang="en-US"/>
           </a:p>
@@ -2326,7 +2326,7 @@
           <a:p>
             <a:fld id="{7B9B12EC-6AA0-374B-A2D3-850081A07A26}" type="datetimeFigureOut">
               <a:rPr kumimoji="1" lang="ja-JP" altLang="en-US" smtClean="0"/>
-              <a:t>2014/10/15</a:t>
+              <a:t>2014/12/23</a:t>
             </a:fld>
             <a:endParaRPr kumimoji="1" lang="ja-JP" altLang="en-US"/>
           </a:p>
@@ -2812,7 +2812,7 @@
           <a:p>
             <a:fld id="{7B9B12EC-6AA0-374B-A2D3-850081A07A26}" type="datetimeFigureOut">
               <a:rPr kumimoji="1" lang="ja-JP" altLang="en-US" smtClean="0"/>
-              <a:t>2014/10/15</a:t>
+              <a:t>2014/12/23</a:t>
             </a:fld>
             <a:endParaRPr kumimoji="1" lang="ja-JP" altLang="en-US"/>
           </a:p>
@@ -2930,7 +2930,7 @@
           <a:p>
             <a:fld id="{7B9B12EC-6AA0-374B-A2D3-850081A07A26}" type="datetimeFigureOut">
               <a:rPr kumimoji="1" lang="ja-JP" altLang="en-US" smtClean="0"/>
-              <a:t>2014/10/15</a:t>
+              <a:t>2014/12/23</a:t>
             </a:fld>
             <a:endParaRPr kumimoji="1" lang="ja-JP" altLang="en-US"/>
           </a:p>
@@ -3025,7 +3025,7 @@
           <a:p>
             <a:fld id="{7B9B12EC-6AA0-374B-A2D3-850081A07A26}" type="datetimeFigureOut">
               <a:rPr kumimoji="1" lang="ja-JP" altLang="en-US" smtClean="0"/>
-              <a:t>2014/10/15</a:t>
+              <a:t>2014/12/23</a:t>
             </a:fld>
             <a:endParaRPr kumimoji="1" lang="ja-JP" altLang="en-US"/>
           </a:p>
@@ -3334,7 +3334,7 @@
           <a:p>
             <a:fld id="{7B9B12EC-6AA0-374B-A2D3-850081A07A26}" type="datetimeFigureOut">
               <a:rPr kumimoji="1" lang="ja-JP" altLang="en-US" smtClean="0"/>
-              <a:t>2014/10/15</a:t>
+              <a:t>2014/12/23</a:t>
             </a:fld>
             <a:endParaRPr kumimoji="1" lang="ja-JP" altLang="en-US"/>
           </a:p>
@@ -3587,7 +3587,7 @@
           <a:p>
             <a:fld id="{7B9B12EC-6AA0-374B-A2D3-850081A07A26}" type="datetimeFigureOut">
               <a:rPr kumimoji="1" lang="ja-JP" altLang="en-US" smtClean="0"/>
-              <a:t>2014/10/15</a:t>
+              <a:t>2014/12/23</a:t>
             </a:fld>
             <a:endParaRPr kumimoji="1" lang="ja-JP" altLang="en-US"/>
           </a:p>
@@ -3832,7 +3832,7 @@
           <a:p>
             <a:fld id="{7B9B12EC-6AA0-374B-A2D3-850081A07A26}" type="datetimeFigureOut">
               <a:rPr kumimoji="1" lang="ja-JP" altLang="en-US" smtClean="0"/>
-              <a:t>2014/10/15</a:t>
+              <a:t>2014/12/23</a:t>
             </a:fld>
             <a:endParaRPr kumimoji="1" lang="ja-JP" altLang="en-US"/>
           </a:p>
@@ -4737,7 +4737,11 @@
             <a:pPr algn="ctr"/>
             <a:r>
               <a:rPr lang="en-US" altLang="ja-JP" sz="1600" dirty="0" smtClean="0"/>
-              <a:t>Integration System</a:t>
+              <a:t>Integration </a:t>
+            </a:r>
+            <a:r>
+              <a:rPr lang="en-US" altLang="ja-JP" sz="1600" dirty="0" smtClean="0"/>
+              <a:t>System Connector</a:t>
             </a:r>
             <a:endParaRPr kumimoji="1" lang="ja-JP" altLang="en-US" sz="1600" dirty="0"/>
           </a:p>
@@ -4928,7 +4932,7 @@
   <p:timing>
     <p:tnLst>
       <p:par>
-        <p:cTn id="1" dur="indefinite" restart="never" nodeType="tmRoot"/>
+        <p:cTn xmlns:p14="http://schemas.microsoft.com/office/powerpoint/2010/main" id="1" dur="indefinite" restart="never" nodeType="tmRoot"/>
       </p:par>
     </p:tnLst>
   </p:timing>
@@ -4960,8 +4964,8 @@
         </p:nvSpPr>
         <p:spPr>
           <a:xfrm>
-            <a:off x="253388" y="2362200"/>
-            <a:ext cx="3600000" cy="1834200"/>
+            <a:off x="253388" y="2044700"/>
+            <a:ext cx="3600000" cy="2151700"/>
           </a:xfrm>
           <a:prstGeom prst="roundRect">
             <a:avLst/>
@@ -5006,7 +5010,7 @@
         </p:nvSpPr>
         <p:spPr>
           <a:xfrm>
-            <a:off x="1320688" y="2923109"/>
+            <a:off x="1320688" y="2681809"/>
             <a:ext cx="1440000" cy="360000"/>
           </a:xfrm>
           <a:prstGeom prst="roundRect">
@@ -5048,7 +5052,7 @@
         </p:nvSpPr>
         <p:spPr>
           <a:xfrm>
-            <a:off x="2211051" y="3574231"/>
+            <a:off x="2211051" y="3536131"/>
             <a:ext cx="1440000" cy="360000"/>
           </a:xfrm>
           <a:prstGeom prst="roundRect">
@@ -5286,8 +5290,8 @@
         </p:nvSpPr>
         <p:spPr>
           <a:xfrm>
-            <a:off x="4870900" y="2362200"/>
-            <a:ext cx="3600000" cy="1849376"/>
+            <a:off x="4870900" y="2044700"/>
+            <a:ext cx="3600000" cy="2166876"/>
           </a:xfrm>
           <a:prstGeom prst="roundRect">
             <a:avLst/>
@@ -5328,8 +5332,8 @@
         </p:nvSpPr>
         <p:spPr>
           <a:xfrm>
-            <a:off x="6872248" y="2984409"/>
-            <a:ext cx="1440000" cy="360000"/>
+            <a:off x="6872248" y="2923108"/>
+            <a:ext cx="1440000" cy="351225"/>
           </a:xfrm>
           <a:prstGeom prst="roundRect">
             <a:avLst/>
@@ -5412,8 +5416,8 @@
         </p:nvSpPr>
         <p:spPr>
           <a:xfrm>
-            <a:off x="5163152" y="2876683"/>
-            <a:ext cx="1351948" cy="575452"/>
+            <a:off x="5163152" y="2527300"/>
+            <a:ext cx="1351948" cy="759735"/>
           </a:xfrm>
           <a:prstGeom prst="roundRect">
             <a:avLst/>
@@ -5448,6 +5452,13 @@
             <a:r>
               <a:rPr lang="en-US" altLang="ja-JP" sz="1600" dirty="0" smtClean="0"/>
               <a:t>System</a:t>
+            </a:r>
+          </a:p>
+          <a:p>
+            <a:pPr algn="ctr"/>
+            <a:r>
+              <a:rPr kumimoji="1" lang="en-US" altLang="ja-JP" sz="1600" dirty="0" smtClean="0"/>
+              <a:t>Connector</a:t>
             </a:r>
             <a:endParaRPr kumimoji="1" lang="ja-JP" altLang="en-US" sz="1600" dirty="0"/>
           </a:p>
@@ -5633,8 +5644,8 @@
         </p:nvCxnSpPr>
         <p:spPr>
           <a:xfrm>
-            <a:off x="2040688" y="3283109"/>
-            <a:ext cx="0" cy="1520296"/>
+            <a:off x="2040688" y="3041809"/>
+            <a:ext cx="0" cy="1761596"/>
           </a:xfrm>
           <a:prstGeom prst="straightConnector1">
             <a:avLst/>
@@ -5735,8 +5746,8 @@
         </p:nvCxnSpPr>
         <p:spPr>
           <a:xfrm>
-            <a:off x="2040688" y="3283109"/>
-            <a:ext cx="890363" cy="291122"/>
+            <a:off x="2040688" y="3041809"/>
+            <a:ext cx="890363" cy="494322"/>
           </a:xfrm>
           <a:prstGeom prst="straightConnector1">
             <a:avLst/>
@@ -5806,8 +5817,8 @@
         </p:nvCxnSpPr>
         <p:spPr>
           <a:xfrm flipH="1">
-            <a:off x="2167967" y="3934231"/>
-            <a:ext cx="763084" cy="921895"/>
+            <a:off x="2167967" y="3896131"/>
+            <a:ext cx="763084" cy="959995"/>
           </a:xfrm>
           <a:prstGeom prst="straightConnector1">
             <a:avLst/>
@@ -5877,8 +5888,8 @@
         </p:nvCxnSpPr>
         <p:spPr>
           <a:xfrm rot="10800000" flipH="1" flipV="1">
-            <a:off x="1320688" y="3103109"/>
-            <a:ext cx="2327806" cy="2628970"/>
+            <a:off x="1320688" y="2861809"/>
+            <a:ext cx="2327806" cy="2870270"/>
           </a:xfrm>
           <a:prstGeom prst="bentConnector3">
             <a:avLst>
@@ -5950,8 +5961,8 @@
         </p:nvCxnSpPr>
         <p:spPr>
           <a:xfrm flipV="1">
-            <a:off x="6626400" y="3344409"/>
-            <a:ext cx="965848" cy="313432"/>
+            <a:off x="6626400" y="3274333"/>
+            <a:ext cx="965848" cy="383508"/>
           </a:xfrm>
           <a:prstGeom prst="straightConnector1">
             <a:avLst/>
@@ -5990,8 +6001,8 @@
         </p:nvCxnSpPr>
         <p:spPr>
           <a:xfrm flipH="1" flipV="1">
-            <a:off x="5839126" y="3452135"/>
-            <a:ext cx="787274" cy="205706"/>
+            <a:off x="5839126" y="3287035"/>
+            <a:ext cx="787274" cy="370806"/>
           </a:xfrm>
           <a:prstGeom prst="straightConnector1">
             <a:avLst/>
@@ -6207,7 +6218,7 @@
   <p:timing>
     <p:tnLst>
       <p:par>
-        <p:cTn id="1" dur="indefinite" restart="never" nodeType="tmRoot"/>
+        <p:cTn xmlns:p14="http://schemas.microsoft.com/office/powerpoint/2010/main" id="1" dur="indefinite" restart="never" nodeType="tmRoot"/>
       </p:par>
     </p:tnLst>
   </p:timing>
@@ -7232,7 +7243,7 @@
   <p:timing>
     <p:tnLst>
       <p:par>
-        <p:cTn id="1" dur="indefinite" restart="never" nodeType="tmRoot"/>
+        <p:cTn xmlns:p14="http://schemas.microsoft.com/office/powerpoint/2010/main" id="1" dur="indefinite" restart="never" nodeType="tmRoot"/>
       </p:par>
     </p:tnLst>
   </p:timing>
@@ -7310,8 +7321,8 @@
         </p:nvSpPr>
         <p:spPr>
           <a:xfrm>
-            <a:off x="3196814" y="1328466"/>
-            <a:ext cx="1575411" cy="360000"/>
+            <a:off x="3120615" y="1328466"/>
+            <a:ext cx="1260886" cy="360000"/>
           </a:xfrm>
           <a:prstGeom prst="roundRect">
             <a:avLst/>
@@ -7352,8 +7363,8 @@
         </p:nvSpPr>
         <p:spPr>
           <a:xfrm>
-            <a:off x="3094035" y="3453566"/>
-            <a:ext cx="1575411" cy="360000"/>
+            <a:off x="3119436" y="3453566"/>
+            <a:ext cx="1262065" cy="360000"/>
           </a:xfrm>
           <a:prstGeom prst="roundRect">
             <a:avLst/>
@@ -7398,8 +7409,8 @@
         </p:nvSpPr>
         <p:spPr>
           <a:xfrm>
-            <a:off x="5544919" y="2050778"/>
-            <a:ext cx="1440000" cy="360000"/>
+            <a:off x="5202019" y="2050778"/>
+            <a:ext cx="1234166" cy="360000"/>
           </a:xfrm>
           <a:prstGeom prst="roundRect">
             <a:avLst/>
@@ -7440,8 +7451,8 @@
         </p:nvSpPr>
         <p:spPr>
           <a:xfrm>
-            <a:off x="5544919" y="2779442"/>
-            <a:ext cx="1440000" cy="360000"/>
+            <a:off x="5202019" y="2779442"/>
+            <a:ext cx="1234166" cy="360000"/>
           </a:xfrm>
           <a:prstGeom prst="roundRect">
             <a:avLst/>
@@ -7482,8 +7493,8 @@
         </p:nvSpPr>
         <p:spPr>
           <a:xfrm>
-            <a:off x="7914464" y="2219008"/>
-            <a:ext cx="1440000" cy="360000"/>
+            <a:off x="7419164" y="2053908"/>
+            <a:ext cx="1297380" cy="360000"/>
           </a:xfrm>
           <a:prstGeom prst="roundRect">
             <a:avLst/>
@@ -7524,8 +7535,8 @@
         </p:nvSpPr>
         <p:spPr>
           <a:xfrm>
-            <a:off x="7914464" y="2778051"/>
-            <a:ext cx="1440000" cy="360000"/>
+            <a:off x="7431864" y="2778051"/>
+            <a:ext cx="1282499" cy="360000"/>
           </a:xfrm>
           <a:prstGeom prst="roundRect">
             <a:avLst/>
@@ -7634,8 +7645,8 @@
         </p:nvSpPr>
         <p:spPr>
           <a:xfrm>
-            <a:off x="9888040" y="2421211"/>
-            <a:ext cx="1800000" cy="540000"/>
+            <a:off x="9087940" y="2319611"/>
+            <a:ext cx="1389560" cy="540000"/>
           </a:xfrm>
           <a:prstGeom prst="roundRect">
             <a:avLst/>
@@ -7662,11 +7673,7 @@
             <a:pPr algn="ctr"/>
             <a:r>
               <a:rPr lang="en-US" altLang="ja-JP" sz="1600" dirty="0" smtClean="0"/>
-              <a:t>O/</a:t>
-            </a:r>
-            <a:r>
-              <a:rPr lang="en-US" altLang="ja-JP" sz="1600" smtClean="0"/>
-              <a:t>R Mapper</a:t>
+              <a:t>O/R Mapper</a:t>
             </a:r>
             <a:endParaRPr kumimoji="1" lang="en-US" altLang="ja-JP" sz="1600" dirty="0" smtClean="0"/>
           </a:p>
@@ -7684,7 +7691,7 @@
         <p:spPr>
           <a:xfrm flipV="1">
             <a:off x="3110288" y="2231445"/>
-            <a:ext cx="1803868" cy="313"/>
+            <a:ext cx="1346668" cy="313"/>
           </a:xfrm>
           <a:prstGeom prst="straightConnector1">
             <a:avLst/>
@@ -7719,8 +7726,8 @@
         </p:nvCxnSpPr>
         <p:spPr>
           <a:xfrm>
-            <a:off x="6984919" y="2230778"/>
-            <a:ext cx="343993" cy="170619"/>
+            <a:off x="6436185" y="2230778"/>
+            <a:ext cx="397427" cy="5519"/>
           </a:xfrm>
           <a:prstGeom prst="straightConnector1">
             <a:avLst/>
@@ -7755,8 +7762,8 @@
         </p:nvCxnSpPr>
         <p:spPr>
           <a:xfrm flipV="1">
-            <a:off x="6984919" y="2958701"/>
-            <a:ext cx="343995" cy="741"/>
+            <a:off x="6436185" y="2958701"/>
+            <a:ext cx="410129" cy="741"/>
           </a:xfrm>
           <a:prstGeom prst="straightConnector1">
             <a:avLst/>
@@ -7791,8 +7798,8 @@
         </p:nvCxnSpPr>
         <p:spPr>
           <a:xfrm>
-            <a:off x="9354464" y="2399008"/>
-            <a:ext cx="533576" cy="292203"/>
+            <a:off x="8716544" y="2233908"/>
+            <a:ext cx="371396" cy="355703"/>
           </a:xfrm>
           <a:prstGeom prst="straightConnector1">
             <a:avLst/>
@@ -7827,8 +7834,8 @@
         </p:nvCxnSpPr>
         <p:spPr>
           <a:xfrm flipV="1">
-            <a:off x="9354464" y="2691211"/>
-            <a:ext cx="533576" cy="266840"/>
+            <a:off x="8714363" y="2589611"/>
+            <a:ext cx="373577" cy="368440"/>
           </a:xfrm>
           <a:prstGeom prst="straightConnector1">
             <a:avLst/>
@@ -7860,8 +7867,8 @@
         </p:nvCxnSpPr>
         <p:spPr>
           <a:xfrm>
-            <a:off x="5419023" y="1679217"/>
-            <a:ext cx="0" cy="2552758"/>
+            <a:off x="4974523" y="907085"/>
+            <a:ext cx="0" cy="3197890"/>
           </a:xfrm>
           <a:prstGeom prst="line">
             <a:avLst/>
@@ -7894,7 +7901,7 @@
         <p:spPr>
           <a:xfrm>
             <a:off x="593837" y="1328466"/>
-            <a:ext cx="1440000" cy="360000"/>
+            <a:ext cx="1234347" cy="360000"/>
           </a:xfrm>
           <a:prstGeom prst="roundRect">
             <a:avLst/>
@@ -7936,7 +7943,7 @@
         <p:spPr>
           <a:xfrm>
             <a:off x="644284" y="3453566"/>
-            <a:ext cx="1440000" cy="360000"/>
+            <a:ext cx="1183900" cy="360000"/>
           </a:xfrm>
           <a:prstGeom prst="roundRect">
             <a:avLst/>
@@ -8045,7 +8052,7 @@
         </p:nvSpPr>
         <p:spPr>
           <a:xfrm>
-            <a:off x="5038559" y="1244151"/>
+            <a:off x="3563661" y="482151"/>
             <a:ext cx="2669324" cy="369332"/>
           </a:xfrm>
           <a:prstGeom prst="rect">
@@ -8097,9 +8104,9 @@
           <p:nvPr/>
         </p:nvCxnSpPr>
         <p:spPr>
-          <a:xfrm rot="1800000" flipH="1">
-            <a:off x="1358785" y="1914685"/>
-            <a:ext cx="503100" cy="1"/>
+          <a:xfrm flipH="1" flipV="1">
+            <a:off x="1392486" y="1710485"/>
+            <a:ext cx="435698" cy="329975"/>
           </a:xfrm>
           <a:prstGeom prst="straightConnector1">
             <a:avLst/>
@@ -8510,7 +8517,7 @@
         </p:nvSpPr>
         <p:spPr>
           <a:xfrm>
-            <a:off x="4914156" y="2041959"/>
+            <a:off x="4456956" y="2041959"/>
             <a:ext cx="378971" cy="378971"/>
           </a:xfrm>
           <a:prstGeom prst="ellipse">
@@ -8548,7 +8555,7 @@
         </p:nvSpPr>
         <p:spPr>
           <a:xfrm>
-            <a:off x="4914156" y="2773495"/>
+            <a:off x="4469656" y="2773495"/>
             <a:ext cx="378971" cy="378971"/>
           </a:xfrm>
           <a:prstGeom prst="ellipse">
@@ -8589,8 +8596,8 @@
         </p:nvCxnSpPr>
         <p:spPr>
           <a:xfrm flipV="1">
-            <a:off x="5293127" y="2230778"/>
-            <a:ext cx="251792" cy="667"/>
+            <a:off x="4835927" y="2230778"/>
+            <a:ext cx="366092" cy="667"/>
           </a:xfrm>
           <a:prstGeom prst="line">
             <a:avLst/>
@@ -8628,8 +8635,8 @@
         </p:nvCxnSpPr>
         <p:spPr>
           <a:xfrm flipV="1">
-            <a:off x="5293127" y="2959442"/>
-            <a:ext cx="251792" cy="3539"/>
+            <a:off x="4848627" y="2959442"/>
+            <a:ext cx="353392" cy="3539"/>
           </a:xfrm>
           <a:prstGeom prst="line">
             <a:avLst/>
@@ -8664,7 +8671,7 @@
         </p:nvSpPr>
         <p:spPr>
           <a:xfrm>
-            <a:off x="7328912" y="2211911"/>
+            <a:off x="6833612" y="2046811"/>
             <a:ext cx="378971" cy="378971"/>
           </a:xfrm>
           <a:prstGeom prst="ellipse">
@@ -8702,7 +8709,7 @@
         </p:nvSpPr>
         <p:spPr>
           <a:xfrm>
-            <a:off x="7328914" y="2769215"/>
+            <a:off x="6846314" y="2769215"/>
             <a:ext cx="378971" cy="378971"/>
           </a:xfrm>
           <a:prstGeom prst="ellipse">
@@ -8743,7 +8750,7 @@
         </p:nvCxnSpPr>
         <p:spPr>
           <a:xfrm flipV="1">
-            <a:off x="7707883" y="2399008"/>
+            <a:off x="7212583" y="2233908"/>
             <a:ext cx="206581" cy="2389"/>
           </a:xfrm>
           <a:prstGeom prst="line">
@@ -8782,7 +8789,7 @@
         </p:nvCxnSpPr>
         <p:spPr>
           <a:xfrm flipV="1">
-            <a:off x="7707885" y="2958051"/>
+            <a:off x="7225285" y="2958051"/>
             <a:ext cx="206579" cy="650"/>
           </a:xfrm>
           <a:prstGeom prst="line">
@@ -9085,8 +9092,8 @@
         </p:nvCxnSpPr>
         <p:spPr>
           <a:xfrm>
-            <a:off x="6984919" y="2230778"/>
-            <a:ext cx="343995" cy="727923"/>
+            <a:off x="6436185" y="2230778"/>
+            <a:ext cx="410129" cy="727923"/>
           </a:xfrm>
           <a:prstGeom prst="straightConnector1">
             <a:avLst/>
@@ -9155,7 +9162,7 @@
         <p:spPr>
           <a:xfrm>
             <a:off x="3110288" y="2954377"/>
-            <a:ext cx="1803868" cy="8604"/>
+            <a:ext cx="1359368" cy="8604"/>
           </a:xfrm>
           <a:prstGeom prst="straightConnector1">
             <a:avLst/>
@@ -9187,8 +9194,8 @@
         </p:nvCxnSpPr>
         <p:spPr>
           <a:xfrm flipV="1">
-            <a:off x="3080357" y="2316087"/>
-            <a:ext cx="1800000" cy="315"/>
+            <a:off x="3080357" y="2316403"/>
+            <a:ext cx="1402745" cy="1"/>
           </a:xfrm>
           <a:prstGeom prst="straightConnector1">
             <a:avLst/>
@@ -9221,8 +9228,8 @@
         </p:nvCxnSpPr>
         <p:spPr>
           <a:xfrm flipV="1">
-            <a:off x="3084889" y="3050092"/>
-            <a:ext cx="1800000" cy="313"/>
+            <a:off x="3084889" y="3050407"/>
+            <a:ext cx="1398213" cy="1"/>
           </a:xfrm>
           <a:prstGeom prst="straightConnector1">
             <a:avLst/>
@@ -9322,9 +9329,9 @@
           <p:nvPr/>
         </p:nvCxnSpPr>
         <p:spPr>
-          <a:xfrm rot="1800000" flipH="1">
-            <a:off x="1477235" y="1914686"/>
-            <a:ext cx="503100" cy="1"/>
+          <a:xfrm flipH="1" flipV="1">
+            <a:off x="1510936" y="1710484"/>
+            <a:ext cx="435698" cy="329977"/>
           </a:xfrm>
           <a:prstGeom prst="straightConnector1">
             <a:avLst/>
@@ -9420,6 +9427,316 @@
               <a:t>Controller2</a:t>
             </a:r>
             <a:endParaRPr kumimoji="1" lang="ja-JP" altLang="en-US" sz="1600" dirty="0"/>
+          </a:p>
+        </p:txBody>
+      </p:sp>
+      <p:sp>
+        <p:nvSpPr>
+          <p:cNvPr id="54" name="テキスト ボックス 53"/>
+          <p:cNvSpPr txBox="1"/>
+          <p:nvPr/>
+        </p:nvSpPr>
+        <p:spPr>
+          <a:xfrm>
+            <a:off x="703270" y="1842579"/>
+            <a:ext cx="594950" cy="369332"/>
+          </a:xfrm>
+          <a:prstGeom prst="rect">
+            <a:avLst/>
+          </a:prstGeom>
+          <a:noFill/>
+        </p:spPr>
+        <p:txBody>
+          <a:bodyPr wrap="square" rtlCol="0">
+            <a:spAutoFit/>
+          </a:bodyPr>
+          <a:lstStyle/>
+          <a:p>
+            <a:pPr algn="ctr"/>
+            <a:r>
+              <a:rPr kumimoji="1" lang="en-US" altLang="ja-JP" dirty="0" smtClean="0"/>
+              <a:t>1</a:t>
+            </a:r>
+            <a:endParaRPr kumimoji="1" lang="ja-JP" altLang="en-US" dirty="0"/>
+          </a:p>
+        </p:txBody>
+      </p:sp>
+      <p:sp>
+        <p:nvSpPr>
+          <p:cNvPr id="55" name="テキスト ボックス 54"/>
+          <p:cNvSpPr txBox="1"/>
+          <p:nvPr/>
+        </p:nvSpPr>
+        <p:spPr>
+          <a:xfrm>
+            <a:off x="2350930" y="1566144"/>
+            <a:ext cx="594950" cy="369332"/>
+          </a:xfrm>
+          <a:prstGeom prst="rect">
+            <a:avLst/>
+          </a:prstGeom>
+          <a:noFill/>
+        </p:spPr>
+        <p:txBody>
+          <a:bodyPr wrap="square" rtlCol="0">
+            <a:spAutoFit/>
+          </a:bodyPr>
+          <a:lstStyle/>
+          <a:p>
+            <a:pPr algn="ctr"/>
+            <a:r>
+              <a:rPr lang="en-US" altLang="ja-JP" dirty="0"/>
+              <a:t>2</a:t>
+            </a:r>
+            <a:endParaRPr kumimoji="1" lang="ja-JP" altLang="en-US" dirty="0"/>
+          </a:p>
+        </p:txBody>
+      </p:sp>
+      <p:sp>
+        <p:nvSpPr>
+          <p:cNvPr id="59" name="テキスト ボックス 58"/>
+          <p:cNvSpPr txBox="1"/>
+          <p:nvPr/>
+        </p:nvSpPr>
+        <p:spPr>
+          <a:xfrm>
+            <a:off x="3747930" y="1819387"/>
+            <a:ext cx="594950" cy="369332"/>
+          </a:xfrm>
+          <a:prstGeom prst="rect">
+            <a:avLst/>
+          </a:prstGeom>
+          <a:noFill/>
+        </p:spPr>
+        <p:txBody>
+          <a:bodyPr wrap="square" rtlCol="0">
+            <a:spAutoFit/>
+          </a:bodyPr>
+          <a:lstStyle/>
+          <a:p>
+            <a:pPr algn="ctr"/>
+            <a:r>
+              <a:rPr lang="en-US" altLang="ja-JP" dirty="0" smtClean="0"/>
+              <a:t>3</a:t>
+            </a:r>
+            <a:endParaRPr kumimoji="1" lang="ja-JP" altLang="en-US" dirty="0"/>
+          </a:p>
+        </p:txBody>
+      </p:sp>
+      <p:sp>
+        <p:nvSpPr>
+          <p:cNvPr id="62" name="テキスト ボックス 61"/>
+          <p:cNvSpPr txBox="1"/>
+          <p:nvPr/>
+        </p:nvSpPr>
+        <p:spPr>
+          <a:xfrm>
+            <a:off x="6314864" y="1793987"/>
+            <a:ext cx="594950" cy="369332"/>
+          </a:xfrm>
+          <a:prstGeom prst="rect">
+            <a:avLst/>
+          </a:prstGeom>
+          <a:noFill/>
+        </p:spPr>
+        <p:txBody>
+          <a:bodyPr wrap="square" rtlCol="0">
+            <a:spAutoFit/>
+          </a:bodyPr>
+          <a:lstStyle/>
+          <a:p>
+            <a:pPr algn="ctr"/>
+            <a:r>
+              <a:rPr lang="en-US" altLang="ja-JP" dirty="0"/>
+              <a:t>4</a:t>
+            </a:r>
+            <a:endParaRPr kumimoji="1" lang="ja-JP" altLang="en-US" dirty="0"/>
+          </a:p>
+        </p:txBody>
+      </p:sp>
+      <p:sp>
+        <p:nvSpPr>
+          <p:cNvPr id="63" name="テキスト ボックス 62"/>
+          <p:cNvSpPr txBox="1"/>
+          <p:nvPr/>
+        </p:nvSpPr>
+        <p:spPr>
+          <a:xfrm>
+            <a:off x="8630625" y="1935476"/>
+            <a:ext cx="594950" cy="369332"/>
+          </a:xfrm>
+          <a:prstGeom prst="rect">
+            <a:avLst/>
+          </a:prstGeom>
+          <a:noFill/>
+        </p:spPr>
+        <p:txBody>
+          <a:bodyPr wrap="square" rtlCol="0">
+            <a:spAutoFit/>
+          </a:bodyPr>
+          <a:lstStyle/>
+          <a:p>
+            <a:pPr algn="ctr"/>
+            <a:r>
+              <a:rPr lang="en-US" altLang="ja-JP" dirty="0" smtClean="0"/>
+              <a:t>5</a:t>
+            </a:r>
+            <a:endParaRPr kumimoji="1" lang="ja-JP" altLang="en-US" dirty="0"/>
+          </a:p>
+        </p:txBody>
+      </p:sp>
+      <p:sp>
+        <p:nvSpPr>
+          <p:cNvPr id="64" name="テキスト ボックス 63"/>
+          <p:cNvSpPr txBox="1"/>
+          <p:nvPr/>
+        </p:nvSpPr>
+        <p:spPr>
+          <a:xfrm>
+            <a:off x="9882550" y="2874358"/>
+            <a:ext cx="594950" cy="369332"/>
+          </a:xfrm>
+          <a:prstGeom prst="rect">
+            <a:avLst/>
+          </a:prstGeom>
+          <a:noFill/>
+        </p:spPr>
+        <p:txBody>
+          <a:bodyPr wrap="square" rtlCol="0">
+            <a:spAutoFit/>
+          </a:bodyPr>
+          <a:lstStyle/>
+          <a:p>
+            <a:pPr algn="ctr"/>
+            <a:r>
+              <a:rPr lang="en-US" altLang="ja-JP" dirty="0"/>
+              <a:t>6</a:t>
+            </a:r>
+            <a:endParaRPr kumimoji="1" lang="ja-JP" altLang="en-US" dirty="0"/>
+          </a:p>
+        </p:txBody>
+      </p:sp>
+      <p:sp>
+        <p:nvSpPr>
+          <p:cNvPr id="65" name="テキスト ボックス 64"/>
+          <p:cNvSpPr txBox="1"/>
+          <p:nvPr/>
+        </p:nvSpPr>
+        <p:spPr>
+          <a:xfrm>
+            <a:off x="3747930" y="2305442"/>
+            <a:ext cx="594950" cy="369332"/>
+          </a:xfrm>
+          <a:prstGeom prst="rect">
+            <a:avLst/>
+          </a:prstGeom>
+          <a:noFill/>
+        </p:spPr>
+        <p:txBody>
+          <a:bodyPr wrap="square" rtlCol="0">
+            <a:spAutoFit/>
+          </a:bodyPr>
+          <a:lstStyle/>
+          <a:p>
+            <a:pPr algn="ctr"/>
+            <a:r>
+              <a:rPr lang="en-US" altLang="ja-JP" dirty="0" smtClean="0"/>
+              <a:t>7</a:t>
+            </a:r>
+            <a:endParaRPr kumimoji="1" lang="ja-JP" altLang="en-US" dirty="0"/>
+          </a:p>
+        </p:txBody>
+      </p:sp>
+      <p:sp>
+        <p:nvSpPr>
+          <p:cNvPr id="66" name="テキスト ボックス 65"/>
+          <p:cNvSpPr txBox="1"/>
+          <p:nvPr/>
+        </p:nvSpPr>
+        <p:spPr>
+          <a:xfrm>
+            <a:off x="2907780" y="1710485"/>
+            <a:ext cx="594950" cy="369332"/>
+          </a:xfrm>
+          <a:prstGeom prst="rect">
+            <a:avLst/>
+          </a:prstGeom>
+          <a:noFill/>
+        </p:spPr>
+        <p:txBody>
+          <a:bodyPr wrap="square" rtlCol="0">
+            <a:spAutoFit/>
+          </a:bodyPr>
+          <a:lstStyle/>
+          <a:p>
+            <a:pPr algn="ctr"/>
+            <a:r>
+              <a:rPr lang="en-US" altLang="ja-JP" dirty="0"/>
+              <a:t>8</a:t>
+            </a:r>
+            <a:endParaRPr kumimoji="1" lang="ja-JP" altLang="en-US" dirty="0"/>
+          </a:p>
+        </p:txBody>
+      </p:sp>
+      <p:sp>
+        <p:nvSpPr>
+          <p:cNvPr id="67" name="テキスト ボックス 66"/>
+          <p:cNvSpPr txBox="1"/>
+          <p:nvPr/>
+        </p:nvSpPr>
+        <p:spPr>
+          <a:xfrm>
+            <a:off x="1678618" y="1629645"/>
+            <a:ext cx="594950" cy="369332"/>
+          </a:xfrm>
+          <a:prstGeom prst="rect">
+            <a:avLst/>
+          </a:prstGeom>
+          <a:noFill/>
+        </p:spPr>
+        <p:txBody>
+          <a:bodyPr wrap="square" rtlCol="0">
+            <a:spAutoFit/>
+          </a:bodyPr>
+          <a:lstStyle/>
+          <a:p>
+            <a:pPr algn="ctr"/>
+            <a:r>
+              <a:rPr lang="en-US" altLang="ja-JP" dirty="0" smtClean="0"/>
+              <a:t>9</a:t>
+            </a:r>
+            <a:endParaRPr kumimoji="1" lang="ja-JP" altLang="en-US" dirty="0"/>
+          </a:p>
+        </p:txBody>
+      </p:sp>
+      <p:sp>
+        <p:nvSpPr>
+          <p:cNvPr id="71" name="テキスト ボックス 70"/>
+          <p:cNvSpPr txBox="1"/>
+          <p:nvPr/>
+        </p:nvSpPr>
+        <p:spPr>
+          <a:xfrm>
+            <a:off x="108320" y="1034085"/>
+            <a:ext cx="594950" cy="369332"/>
+          </a:xfrm>
+          <a:prstGeom prst="rect">
+            <a:avLst/>
+          </a:prstGeom>
+          <a:noFill/>
+        </p:spPr>
+        <p:txBody>
+          <a:bodyPr wrap="square" rtlCol="0">
+            <a:spAutoFit/>
+          </a:bodyPr>
+          <a:lstStyle/>
+          <a:p>
+            <a:pPr algn="ctr"/>
+            <a:r>
+              <a:rPr lang="en-US" altLang="ja-JP" dirty="0" smtClean="0"/>
+              <a:t>10</a:t>
+            </a:r>
+            <a:endParaRPr kumimoji="1" lang="ja-JP" altLang="en-US" dirty="0"/>
           </a:p>
         </p:txBody>
       </p:sp>
@@ -9436,7 +9753,7 @@
   <p:timing>
     <p:tnLst>
       <p:par>
-        <p:cTn id="1" dur="indefinite" restart="never" nodeType="tmRoot"/>
+        <p:cTn xmlns:p14="http://schemas.microsoft.com/office/powerpoint/2010/main" id="1" dur="indefinite" restart="never" nodeType="tmRoot"/>
       </p:par>
     </p:tnLst>
   </p:timing>
@@ -9754,8 +10071,8 @@
         </p:nvSpPr>
         <p:spPr>
           <a:xfrm>
-            <a:off x="7928663" y="2388244"/>
-            <a:ext cx="1800000" cy="540000"/>
+            <a:off x="7560363" y="2350144"/>
+            <a:ext cx="1524481" cy="540000"/>
           </a:xfrm>
           <a:prstGeom prst="roundRect">
             <a:avLst/>
@@ -9840,7 +10157,7 @@
         <p:spPr>
           <a:xfrm>
             <a:off x="6984919" y="2230778"/>
-            <a:ext cx="943744" cy="427466"/>
+            <a:ext cx="575444" cy="389366"/>
           </a:xfrm>
           <a:prstGeom prst="straightConnector1">
             <a:avLst/>
@@ -9875,8 +10192,8 @@
         </p:nvCxnSpPr>
         <p:spPr>
           <a:xfrm flipV="1">
-            <a:off x="6984919" y="2658244"/>
-            <a:ext cx="943744" cy="301198"/>
+            <a:off x="6984919" y="2620144"/>
+            <a:ext cx="575444" cy="339298"/>
           </a:xfrm>
           <a:prstGeom prst="straightConnector1">
             <a:avLst/>
@@ -9908,8 +10225,8 @@
         </p:nvCxnSpPr>
         <p:spPr>
           <a:xfrm>
-            <a:off x="5419023" y="1679217"/>
-            <a:ext cx="0" cy="2552758"/>
+            <a:off x="5419023" y="876883"/>
+            <a:ext cx="0" cy="3355092"/>
           </a:xfrm>
           <a:prstGeom prst="line">
             <a:avLst/>
@@ -10093,7 +10410,7 @@
         </p:nvSpPr>
         <p:spPr>
           <a:xfrm>
-            <a:off x="5038559" y="1244151"/>
+            <a:off x="3981657" y="482151"/>
             <a:ext cx="2669324" cy="369332"/>
           </a:xfrm>
           <a:prstGeom prst="rect">
@@ -11294,7 +11611,7 @@
   <p:timing>
     <p:tnLst>
       <p:par>
-        <p:cTn id="1" dur="indefinite" restart="never" nodeType="tmRoot"/>
+        <p:cTn xmlns:p14="http://schemas.microsoft.com/office/powerpoint/2010/main" id="1" dur="indefinite" restart="never" nodeType="tmRoot"/>
       </p:par>
     </p:tnLst>
   </p:timing>

</xml_diff>